<commit_message>
Update block diagram in design review to fix text background problem
</commit_message>
<xml_diff>
--- a/doc/Team5DesignReview.pptx
+++ b/doc/Team5DesignReview.pptx
@@ -141,7 +141,7 @@
   </p:defaultTextStyle>
   <p:extLst>
     <p:ext uri="{EFAFB233-063F-42B5-8137-9DF3F51BA10A}">
-      <p15:sldGuideLst xmlns:p15="http://schemas.microsoft.com/office/powerpoint/2012/main">
+      <p15:sldGuideLst xmlns:p15="http://schemas.microsoft.com/office/powerpoint/2012/main" xmlns="">
         <p15:guide id="1" orient="horz" pos="2160">
           <p15:clr>
             <a:srgbClr val="A4A3A4"/>
@@ -5112,21 +5112,12 @@
               <a:rPr lang="en-US" dirty="0" smtClean="0"/>
               <a:t>Venus638LPx</a:t>
             </a:r>
-            <a:endParaRPr lang="en-US" dirty="0" smtClean="0"/>
           </a:p>
           <a:p>
             <a:pPr lvl="2"/>
             <a:r>
               <a:rPr lang="en-US" dirty="0" smtClean="0"/>
-              <a:t>High accuracy </a:t>
-            </a:r>
-            <a:r>
-              <a:rPr lang="en-US" dirty="0" smtClean="0"/>
-              <a:t>(claimed 2.5m</a:t>
-            </a:r>
-            <a:r>
-              <a:rPr lang="en-US" dirty="0" smtClean="0"/>
-              <a:t>) and refresh rate (20Hz)</a:t>
+              <a:t>High accuracy (claimed 2.5m) and refresh rate (20Hz)</a:t>
             </a:r>
           </a:p>
           <a:p>
@@ -5146,11 +5137,7 @@
             <a:pPr lvl="2"/>
             <a:r>
               <a:rPr lang="en-US" dirty="0" smtClean="0"/>
-              <a:t>Low cost but still high </a:t>
-            </a:r>
-            <a:r>
-              <a:rPr lang="en-US" dirty="0" smtClean="0"/>
-              <a:t>accuracy</a:t>
+              <a:t>Low cost but still high accuracy</a:t>
             </a:r>
           </a:p>
           <a:p>
@@ -5159,7 +5146,6 @@
               <a:rPr lang="en-US" dirty="0" smtClean="0"/>
               <a:t>More expensive unit has on-chip filtering but requires NDA</a:t>
             </a:r>
-            <a:endParaRPr lang="en-US" dirty="0" smtClean="0"/>
           </a:p>
           <a:p>
             <a:r>
@@ -12638,26 +12624,66 @@
       </p:sp>
       <p:pic>
         <p:nvPicPr>
-          <p:cNvPr id="6" name="Picture 5"/>
+          <p:cNvPr id="1027" name="Picture 3"/>
           <p:cNvPicPr>
-            <a:picLocks noChangeAspect="1"/>
+            <a:picLocks noChangeAspect="1" noChangeArrowheads="1"/>
           </p:cNvPicPr>
           <p:nvPr/>
         </p:nvPicPr>
         <p:blipFill>
-          <a:blip r:embed="rId2"/>
+          <a:blip r:embed="rId2">
+            <a:extLst>
+              <a:ext uri="{28A0092B-C50C-407E-A947-70E740481C1C}">
+                <a14:useLocalDpi xmlns:a14="http://schemas.microsoft.com/office/drawing/2010/main" val="0"/>
+              </a:ext>
+            </a:extLst>
+          </a:blip>
+          <a:srcRect/>
           <a:stretch>
             <a:fillRect/>
           </a:stretch>
         </p:blipFill>
-        <p:spPr>
+        <p:spPr bwMode="auto">
           <a:xfrm>
-            <a:off x="3651336" y="1447800"/>
-            <a:ext cx="4790605" cy="5105400"/>
+            <a:off x="3516595" y="1295400"/>
+            <a:ext cx="4971854" cy="5410200"/>
           </a:xfrm>
           <a:prstGeom prst="rect">
             <a:avLst/>
           </a:prstGeom>
+          <a:noFill/>
+          <a:ln>
+            <a:noFill/>
+          </a:ln>
+          <a:effectLst/>
+          <a:extLst>
+            <a:ext uri="{909E8E84-426E-40DD-AFC4-6F175D3DCCD1}">
+              <a14:hiddenFill xmlns:a14="http://schemas.microsoft.com/office/drawing/2010/main">
+                <a:solidFill>
+                  <a:schemeClr val="accent1"/>
+                </a:solidFill>
+              </a14:hiddenFill>
+            </a:ext>
+            <a:ext uri="{91240B29-F687-4F45-9708-019B960494DF}">
+              <a14:hiddenLine xmlns:a14="http://schemas.microsoft.com/office/drawing/2010/main" w="9525">
+                <a:solidFill>
+                  <a:schemeClr val="tx1"/>
+                </a:solidFill>
+                <a:miter lim="800000"/>
+                <a:headEnd/>
+                <a:tailEnd/>
+              </a14:hiddenLine>
+            </a:ext>
+            <a:ext uri="{AF507438-7753-43E0-B8FC-AC1667EBCBE1}">
+              <a14:hiddenEffects xmlns:a14="http://schemas.microsoft.com/office/drawing/2010/main">
+                <a:effectLst>
+                  <a:outerShdw dist="35921" dir="2700000" algn="ctr" rotWithShape="0">
+                    <a:schemeClr val="bg2"/>
+                  </a:outerShdw>
+                </a:effectLst>
+              </a14:hiddenEffects>
+            </a:ext>
+          </a:extLst>
         </p:spPr>
       </p:pic>
     </p:spTree>
@@ -13315,7 +13341,6 @@
               <a:rPr lang="en-US" sz="2400" dirty="0" smtClean="0"/>
               <a:t>)</a:t>
             </a:r>
-            <a:endParaRPr lang="en-US" sz="2400" dirty="0" smtClean="0"/>
           </a:p>
         </p:txBody>
       </p:sp>
@@ -13336,11 +13361,7 @@
           <a:p>
             <a:r>
               <a:rPr lang="en-US" dirty="0" smtClean="0"/>
-              <a:t>Motherboard </a:t>
-            </a:r>
-            <a:r>
-              <a:rPr lang="en-US" dirty="0" smtClean="0"/>
-              <a:t>Constraints (CCU)</a:t>
+              <a:t>Motherboard Constraints (CCU)</a:t>
             </a:r>
             <a:endParaRPr lang="en-US" dirty="0"/>
           </a:p>
@@ -13855,7 +13876,7 @@
   <a:extraClrSchemeLst/>
   <a:extLst>
     <a:ext uri="{05A4C25C-085E-4340-85A3-A5531E510DB2}">
-      <thm15:themeFamily xmlns:thm15="http://schemas.microsoft.com/office/thememl/2012/main" name="Office Theme" id="{62F939B6-93AF-4DB8-9C6B-D6C7DFDC589F}" vid="{4A3C46E8-61CC-4603-A589-7422A47A8E4A}"/>
+      <thm15:themeFamily xmlns:thm15="http://schemas.microsoft.com/office/thememl/2012/main" xmlns="" name="Office Theme" id="{62F939B6-93AF-4DB8-9C6B-D6C7DFDC589F}" vid="{4A3C46E8-61CC-4603-A589-7422A47A8E4A}"/>
     </a:ext>
   </a:extLst>
 </a:theme>

</xml_diff>